<commit_message>
removed hardcoding of the files updated the presentation added download json file to the api
</commit_message>
<xml_diff>
--- a/Protocol buffers.pptx
+++ b/Protocol buffers.pptx
@@ -18,10 +18,10 @@
     <p:sldId id="316" r:id="rId9"/>
     <p:sldId id="317" r:id="rId10"/>
     <p:sldId id="318" r:id="rId11"/>
-    <p:sldId id="322" r:id="rId12"/>
-    <p:sldId id="319" r:id="rId13"/>
-    <p:sldId id="323" r:id="rId14"/>
-    <p:sldId id="320" r:id="rId15"/>
+    <p:sldId id="323" r:id="rId12"/>
+    <p:sldId id="320" r:id="rId13"/>
+    <p:sldId id="322" r:id="rId14"/>
+    <p:sldId id="319" r:id="rId15"/>
     <p:sldId id="324" r:id="rId16"/>
     <p:sldId id="321" r:id="rId17"/>
     <p:sldId id="326" r:id="rId18"/>
@@ -218,7 +218,7 @@
           <a:p>
             <a:fld id="{F4985468-EA09-47E3-8036-5BF84197CAEF}" type="datetimeFigureOut">
               <a:rPr lang="en-GB" smtClean="0"/>
-              <a:t>01/12/2018</a:t>
+              <a:t>16/12/2018</a:t>
             </a:fld>
             <a:endParaRPr lang="en-GB"/>
           </a:p>
@@ -383,7 +383,7 @@
           <a:p>
             <a:fld id="{C303BD5E-F603-431C-B79D-697385AE35AF}" type="datetimeFigureOut">
               <a:rPr lang="en-GB" smtClean="0"/>
-              <a:t>01/12/2018</a:t>
+              <a:t>16/12/2018</a:t>
             </a:fld>
             <a:endParaRPr lang="en-GB"/>
           </a:p>
@@ -6453,9 +6453,12 @@
           <a:p>
             <a:r>
               <a:rPr lang="en-US" smtClean="0"/>
-              <a:t>4 Dec 2018</a:t>
-            </a:r>
-            <a:endParaRPr lang="en-US" dirty="0" smtClean="0"/>
+              <a:t>16 </a:t>
+            </a:r>
+            <a:r>
+              <a:rPr lang="en-US" dirty="0" smtClean="0"/>
+              <a:t>Dec 2018</a:t>
+            </a:r>
           </a:p>
         </p:txBody>
       </p:sp>
@@ -6508,15 +6511,14 @@
         </p:nvSpPr>
         <p:spPr/>
         <p:txBody>
-          <a:bodyPr>
-            <a:normAutofit/>
-          </a:bodyPr>
+          <a:bodyPr/>
           <a:lstStyle/>
           <a:p>
             <a:r>
-              <a:rPr lang="en-US" sz="4400" b="0" dirty="0"/>
-              <a:t>Protocol buffers</a:t>
-            </a:r>
+              <a:rPr lang="en-US" sz="4400" dirty="0" smtClean="0"/>
+              <a:t>Thrift</a:t>
+            </a:r>
+            <a:endParaRPr lang="en-US" sz="4400" dirty="0"/>
           </a:p>
         </p:txBody>
       </p:sp>
@@ -6559,7 +6561,7 @@
           <a:lstStyle/>
           <a:p>
             <a:r>
-              <a:rPr lang="en-US" sz="2800" dirty="0"/>
+              <a:rPr lang="en-US" sz="2800" dirty="0" smtClean="0"/>
               <a:t>Facts:</a:t>
             </a:r>
           </a:p>
@@ -6570,9 +6572,8 @@
             </a:pPr>
             <a:r>
               <a:rPr lang="en-US" dirty="0" smtClean="0"/>
-              <a:t>Developed by Google</a:t>
-            </a:r>
-            <a:endParaRPr lang="en-US" dirty="0"/>
+              <a:t>Apache license</a:t>
+            </a:r>
           </a:p>
           <a:p>
             <a:pPr marL="285750" indent="-285750">
@@ -6581,7 +6582,7 @@
             </a:pPr>
             <a:r>
               <a:rPr lang="en-US" dirty="0" smtClean="0"/>
-              <a:t>Compatible just with: C++, C#, Dart, Go, Java, Python</a:t>
+              <a:t>Wide range of programming languages</a:t>
             </a:r>
           </a:p>
           <a:p>
@@ -6590,37 +6591,21 @@
               <a:buChar char="•"/>
             </a:pPr>
             <a:r>
+              <a:rPr lang="en-US" dirty="0"/>
+              <a:t>Not compatible for .NET </a:t>
+            </a:r>
+            <a:r>
               <a:rPr lang="en-US" dirty="0" smtClean="0"/>
-              <a:t>Exists a wrapper for it</a:t>
-            </a:r>
-            <a:r>
-              <a:rPr lang="en-US" dirty="0"/>
-              <a:t>: </a:t>
-            </a:r>
-            <a:r>
-              <a:rPr lang="en-US" dirty="0">
-                <a:hlinkClick r:id="rId2"/>
-              </a:rPr>
-              <a:t>https://</a:t>
-            </a:r>
-            <a:r>
-              <a:rPr lang="en-US" dirty="0" smtClean="0">
-                <a:hlinkClick r:id="rId2"/>
-              </a:rPr>
-              <a:t>github.com/mgravell/protobuf-net</a:t>
+              <a:t>Core</a:t>
             </a:r>
             <a:endParaRPr lang="en-US" dirty="0"/>
           </a:p>
           <a:p>
             <a:r>
-              <a:rPr lang="en-US" sz="2800" dirty="0"/>
-              <a:t>Personal </a:t>
-            </a:r>
-            <a:r>
               <a:rPr lang="en-US" sz="2800" dirty="0" smtClean="0"/>
-              <a:t>thoughts:</a:t>
-            </a:r>
-            <a:endParaRPr lang="en-US" dirty="0"/>
+              <a:t>Personal thoughts:</a:t>
+            </a:r>
+            <a:endParaRPr lang="en-US" dirty="0" smtClean="0"/>
           </a:p>
           <a:p>
             <a:pPr marL="285750" indent="-285750">
@@ -6628,16 +6613,8 @@
               <a:buChar char="•"/>
             </a:pPr>
             <a:r>
-              <a:rPr lang="en-US" dirty="0"/>
-              <a:t>C</a:t>
-            </a:r>
-            <a:r>
               <a:rPr lang="en-US" dirty="0" smtClean="0"/>
-              <a:t>ompatible </a:t>
-            </a:r>
-            <a:r>
-              <a:rPr lang="en-US" dirty="0"/>
-              <a:t>for .NET Core</a:t>
+              <a:t>Pretty difficult to find the thrift.exe file on the web</a:t>
             </a:r>
           </a:p>
           <a:p>
@@ -6646,8 +6623,8 @@
               <a:buChar char="•"/>
             </a:pPr>
             <a:r>
-              <a:rPr lang="en-US" dirty="0"/>
-              <a:t>Pretty difficult to find the .exe</a:t>
+              <a:rPr lang="en-US" dirty="0" smtClean="0"/>
+              <a:t>Much slower than JSON.NET</a:t>
             </a:r>
           </a:p>
           <a:p>
@@ -6657,25 +6634,24 @@
             </a:pPr>
             <a:r>
               <a:rPr lang="en-US" dirty="0" smtClean="0"/>
-              <a:t>Faster than JSON.NET</a:t>
-            </a:r>
-          </a:p>
-          <a:p>
-            <a:pPr marL="285750" indent="-285750">
-              <a:buFont typeface="Arial" panose="020B0604020202020204" pitchFamily="34" charset="0"/>
-              <a:buChar char="•"/>
-            </a:pPr>
-            <a:r>
-              <a:rPr lang="en-US" dirty="0" smtClean="0"/>
-              <a:t>Difficult to set up in the classic way</a:t>
-            </a:r>
+              <a:t>Younger than Protocol Buffers but left behind, unfortunately. </a:t>
+            </a:r>
+          </a:p>
+          <a:p>
+            <a:endParaRPr lang="en-US" dirty="0" smtClean="0"/>
+          </a:p>
+          <a:p>
+            <a:endParaRPr lang="en-US" dirty="0" smtClean="0"/>
+          </a:p>
+          <a:p>
+            <a:endParaRPr lang="en-US" dirty="0"/>
           </a:p>
         </p:txBody>
       </p:sp>
     </p:spTree>
     <p:extLst>
       <p:ext uri="{BB962C8B-B14F-4D97-AF65-F5344CB8AC3E}">
-        <p14:creationId xmlns:p14="http://schemas.microsoft.com/office/powerpoint/2010/main" val="3012824171"/>
+        <p14:creationId xmlns:p14="http://schemas.microsoft.com/office/powerpoint/2010/main" val="2848583078"/>
       </p:ext>
     </p:extLst>
   </p:cSld>
@@ -6791,17 +6767,19 @@
             <a:endParaRPr lang="en-US" b="0" dirty="0" smtClean="0"/>
           </a:p>
           <a:p>
-            <a:r>
-              <a:rPr lang="en-US" sz="6600" b="0" dirty="0"/>
-              <a:t>Demo – Protocol buffers</a:t>
-            </a:r>
+            <a:pPr algn="ctr"/>
+            <a:r>
+              <a:rPr lang="en-US" sz="6600" b="0" dirty="0" smtClean="0"/>
+              <a:t>Demo Thrift!</a:t>
+            </a:r>
+            <a:endParaRPr lang="en-US" sz="6600" dirty="0"/>
           </a:p>
         </p:txBody>
       </p:sp>
     </p:spTree>
     <p:extLst>
       <p:ext uri="{BB962C8B-B14F-4D97-AF65-F5344CB8AC3E}">
-        <p14:creationId xmlns:p14="http://schemas.microsoft.com/office/powerpoint/2010/main" val="3247895610"/>
+        <p14:creationId xmlns:p14="http://schemas.microsoft.com/office/powerpoint/2010/main" val="2270836482"/>
       </p:ext>
     </p:extLst>
   </p:cSld>
@@ -6963,6 +6941,23 @@
               <a:rPr lang="en-US" dirty="0" smtClean="0"/>
               <a:t>Unsuccessful setup, no input for the moment</a:t>
             </a:r>
+          </a:p>
+          <a:p>
+            <a:pPr marL="457200" indent="-457200">
+              <a:buFont typeface="Arial" panose="020B0604020202020204" pitchFamily="34" charset="0"/>
+              <a:buChar char="•"/>
+            </a:pPr>
+            <a:r>
+              <a:rPr lang="en-US" dirty="0" smtClean="0"/>
+              <a:t>It is made upon JSON.NET</a:t>
+            </a:r>
+          </a:p>
+          <a:p>
+            <a:pPr marL="457200" indent="-457200">
+              <a:buFont typeface="Arial" panose="020B0604020202020204" pitchFamily="34" charset="0"/>
+              <a:buChar char="•"/>
+            </a:pPr>
+            <a:endParaRPr lang="en-US" dirty="0" smtClean="0"/>
           </a:p>
         </p:txBody>
       </p:sp>
@@ -7343,25 +7338,14 @@
           <a:p>
             <a:r>
               <a:rPr lang="en-US" sz="2800" dirty="0" smtClean="0"/>
-              <a:t>Set up Google Protocol Buffers for classic serialization</a:t>
+              <a:t>Enable a bench mark feature</a:t>
             </a:r>
           </a:p>
           <a:p>
             <a:r>
               <a:rPr lang="en-US" sz="2800" dirty="0" smtClean="0"/>
-              <a:t>Enable a bench mark </a:t>
-            </a:r>
-            <a:r>
-              <a:rPr lang="en-US" sz="2800" dirty="0" smtClean="0"/>
-              <a:t>feature</a:t>
-            </a:r>
-          </a:p>
-          <a:p>
-            <a:r>
-              <a:rPr lang="en-US" sz="2800" smtClean="0"/>
               <a:t>Code review/comments</a:t>
             </a:r>
-            <a:endParaRPr lang="en-US" sz="2800" dirty="0" smtClean="0"/>
           </a:p>
           <a:p>
             <a:r>
@@ -8405,12 +8389,12 @@
         <p:spPr/>
         <p:txBody>
           <a:bodyPr>
-            <a:normAutofit lnSpcReduction="10000"/>
+            <a:normAutofit fontScale="92500" lnSpcReduction="10000"/>
           </a:bodyPr>
           <a:lstStyle/>
           <a:p>
             <a:r>
-              <a:rPr lang="en-US" sz="2800" dirty="0" smtClean="0"/>
+              <a:rPr lang="en-US" sz="3600" dirty="0" smtClean="0"/>
               <a:t>Protocol buffers</a:t>
             </a:r>
           </a:p>
@@ -8446,7 +8430,7 @@
           </a:p>
           <a:p>
             <a:r>
-              <a:rPr lang="en-US" sz="2800" dirty="0" smtClean="0"/>
+              <a:rPr lang="en-US" sz="3600" dirty="0" smtClean="0"/>
               <a:t>Thrift</a:t>
             </a:r>
           </a:p>
@@ -8472,7 +8456,7 @@
           </a:p>
           <a:p>
             <a:r>
-              <a:rPr lang="en-US" sz="2800" dirty="0" smtClean="0"/>
+              <a:rPr lang="en-US" sz="3900" dirty="0" smtClean="0"/>
               <a:t>Avro</a:t>
             </a:r>
           </a:p>
@@ -8613,15 +8597,7 @@
             </a:r>
             <a:r>
               <a:rPr lang="en-US" sz="2800" dirty="0" smtClean="0"/>
-              <a:t> </a:t>
-            </a:r>
-            <a:r>
-              <a:rPr lang="en-US" sz="2800" dirty="0" err="1" smtClean="0"/>
-              <a:t>ia</a:t>
-            </a:r>
-            <a:r>
-              <a:rPr lang="en-US" sz="2800" dirty="0" smtClean="0"/>
-              <a:t> file with a specific extension (</a:t>
+              <a:t> in a file with a specific extension (</a:t>
             </a:r>
             <a:r>
               <a:rPr lang="en-US" sz="2800" dirty="0" err="1" smtClean="0"/>
@@ -8629,7 +8605,7 @@
             </a:r>
             <a:r>
               <a:rPr lang="en-US" sz="2800" dirty="0" smtClean="0"/>
-              <a:t>: .thrift)</a:t>
+              <a:t>: .proto)</a:t>
             </a:r>
           </a:p>
           <a:p>
@@ -8702,14 +8678,15 @@
         </p:nvSpPr>
         <p:spPr/>
         <p:txBody>
-          <a:bodyPr/>
+          <a:bodyPr>
+            <a:normAutofit/>
+          </a:bodyPr>
           <a:lstStyle/>
           <a:p>
             <a:r>
-              <a:rPr lang="en-US" sz="4400" dirty="0" smtClean="0"/>
-              <a:t>Thrift</a:t>
-            </a:r>
-            <a:endParaRPr lang="en-US" sz="4400" dirty="0"/>
+              <a:rPr lang="en-US" sz="4400" b="0" dirty="0"/>
+              <a:t>Protocol buffers</a:t>
+            </a:r>
           </a:p>
         </p:txBody>
       </p:sp>
@@ -8752,7 +8729,7 @@
           <a:lstStyle/>
           <a:p>
             <a:r>
-              <a:rPr lang="en-US" sz="2800" dirty="0" smtClean="0"/>
+              <a:rPr lang="en-US" sz="2800" dirty="0"/>
               <a:t>Facts:</a:t>
             </a:r>
           </a:p>
@@ -8763,8 +8740,9 @@
             </a:pPr>
             <a:r>
               <a:rPr lang="en-US" dirty="0" smtClean="0"/>
-              <a:t>Apache license</a:t>
-            </a:r>
+              <a:t>Developed by Google</a:t>
+            </a:r>
+            <a:endParaRPr lang="en-US" dirty="0"/>
           </a:p>
           <a:p>
             <a:pPr marL="285750" indent="-285750">
@@ -8773,7 +8751,7 @@
             </a:pPr>
             <a:r>
               <a:rPr lang="en-US" dirty="0" smtClean="0"/>
-              <a:t>Wide range of programming languages</a:t>
+              <a:t>Compatible just with: C++, C#, Dart, Go, Java, Python</a:t>
             </a:r>
           </a:p>
           <a:p>
@@ -8782,21 +8760,37 @@
               <a:buChar char="•"/>
             </a:pPr>
             <a:r>
+              <a:rPr lang="en-US" dirty="0" smtClean="0"/>
+              <a:t>Exists a wrapper for it</a:t>
+            </a:r>
+            <a:r>
               <a:rPr lang="en-US" dirty="0"/>
-              <a:t>Not compatible for .NET </a:t>
-            </a:r>
-            <a:r>
-              <a:rPr lang="en-US" dirty="0" smtClean="0"/>
-              <a:t>Core</a:t>
+              <a:t>: </a:t>
+            </a:r>
+            <a:r>
+              <a:rPr lang="en-US" dirty="0">
+                <a:hlinkClick r:id="rId2"/>
+              </a:rPr>
+              <a:t>https://</a:t>
+            </a:r>
+            <a:r>
+              <a:rPr lang="en-US" dirty="0" smtClean="0">
+                <a:hlinkClick r:id="rId2"/>
+              </a:rPr>
+              <a:t>github.com/mgravell/protobuf-net</a:t>
             </a:r>
             <a:endParaRPr lang="en-US" dirty="0"/>
           </a:p>
           <a:p>
             <a:r>
+              <a:rPr lang="en-US" sz="2800" dirty="0"/>
+              <a:t>Personal </a:t>
+            </a:r>
+            <a:r>
               <a:rPr lang="en-US" sz="2800" dirty="0" smtClean="0"/>
-              <a:t>Personal thoughts:</a:t>
-            </a:r>
-            <a:endParaRPr lang="en-US" dirty="0" smtClean="0"/>
+              <a:t>thoughts:</a:t>
+            </a:r>
+            <a:endParaRPr lang="en-US" dirty="0"/>
           </a:p>
           <a:p>
             <a:pPr marL="285750" indent="-285750">
@@ -8804,8 +8798,20 @@
               <a:buChar char="•"/>
             </a:pPr>
             <a:r>
+              <a:rPr lang="en-US" dirty="0"/>
+              <a:t>C</a:t>
+            </a:r>
+            <a:r>
               <a:rPr lang="en-US" dirty="0" smtClean="0"/>
-              <a:t>Pretty difficult to find the thrift.exe file on the web</a:t>
+              <a:t>ompatible </a:t>
+            </a:r>
+            <a:r>
+              <a:rPr lang="en-US" dirty="0"/>
+              <a:t>for .NET </a:t>
+            </a:r>
+            <a:r>
+              <a:rPr lang="en-US" dirty="0" smtClean="0"/>
+              <a:t>Core</a:t>
             </a:r>
           </a:p>
           <a:p>
@@ -8814,9 +8820,14 @@
               <a:buChar char="•"/>
             </a:pPr>
             <a:r>
+              <a:rPr lang="en-US" dirty="0"/>
+              <a:t>Faster than </a:t>
+            </a:r>
+            <a:r>
               <a:rPr lang="en-US" dirty="0" smtClean="0"/>
-              <a:t>Much slower than JSON.NET</a:t>
-            </a:r>
+              <a:t>JSON.NET</a:t>
+            </a:r>
+            <a:endParaRPr lang="en-US" dirty="0"/>
           </a:p>
           <a:p>
             <a:pPr marL="285750" indent="-285750">
@@ -8824,17 +8835,13 @@
               <a:buChar char="•"/>
             </a:pPr>
             <a:r>
+              <a:rPr lang="en-US" dirty="0"/>
+              <a:t>Pretty difficult to find the .</a:t>
+            </a:r>
+            <a:r>
               <a:rPr lang="en-US" dirty="0" smtClean="0"/>
-              <a:t>Younger than Protocol Buffers but left behind, unfortunately. </a:t>
-            </a:r>
-          </a:p>
-          <a:p>
-            <a:endParaRPr lang="en-US" dirty="0" smtClean="0"/>
-          </a:p>
-          <a:p>
-            <a:endParaRPr lang="en-US" dirty="0" smtClean="0"/>
-          </a:p>
-          <a:p>
+              <a:t>exe file in order to perform the setup</a:t>
+            </a:r>
             <a:endParaRPr lang="en-US" dirty="0"/>
           </a:p>
         </p:txBody>
@@ -8842,7 +8849,7 @@
     </p:spTree>
     <p:extLst>
       <p:ext uri="{BB962C8B-B14F-4D97-AF65-F5344CB8AC3E}">
-        <p14:creationId xmlns:p14="http://schemas.microsoft.com/office/powerpoint/2010/main" val="2848583078"/>
+        <p14:creationId xmlns:p14="http://schemas.microsoft.com/office/powerpoint/2010/main" val="3012824171"/>
       </p:ext>
     </p:extLst>
   </p:cSld>
@@ -8958,19 +8965,17 @@
             <a:endParaRPr lang="en-US" b="0" dirty="0" smtClean="0"/>
           </a:p>
           <a:p>
-            <a:pPr algn="ctr"/>
-            <a:r>
-              <a:rPr lang="en-US" sz="6600" b="0" dirty="0" smtClean="0"/>
-              <a:t>Demo Thrift!</a:t>
-            </a:r>
-            <a:endParaRPr lang="en-US" sz="6600" dirty="0"/>
+            <a:r>
+              <a:rPr lang="en-US" sz="6600" b="0" dirty="0"/>
+              <a:t>Demo – Protocol buffers</a:t>
+            </a:r>
           </a:p>
         </p:txBody>
       </p:sp>
     </p:spTree>
     <p:extLst>
       <p:ext uri="{BB962C8B-B14F-4D97-AF65-F5344CB8AC3E}">
-        <p14:creationId xmlns:p14="http://schemas.microsoft.com/office/powerpoint/2010/main" val="2270836482"/>
+        <p14:creationId xmlns:p14="http://schemas.microsoft.com/office/powerpoint/2010/main" val="3247895610"/>
       </p:ext>
     </p:extLst>
   </p:cSld>
@@ -9764,15 +9769,6 @@
 </file>
 
 <file path=customXml/item1.xml><?xml version="1.0" encoding="utf-8"?>
-<?mso-contentType ?>
-<FormTemplates xmlns="http://schemas.microsoft.com/sharepoint/v3/contenttype/forms">
-  <Display>DocumentLibraryForm</Display>
-  <Edit>DocumentLibraryForm</Edit>
-  <New>DocumentLibraryForm</New>
-</FormTemplates>
-</file>
-
-<file path=customXml/item2.xml><?xml version="1.0" encoding="utf-8"?>
 <ct:contentTypeSchema xmlns:ct="http://schemas.microsoft.com/office/2006/metadata/contentType" xmlns:ma="http://schemas.microsoft.com/office/2006/metadata/properties/metaAttributes" ct:_="" ma:_="" ma:contentTypeName="Document" ma:contentTypeID="0x010100B74DE8F874A57D40BE181F274FFEEB68" ma:contentTypeVersion="0" ma:contentTypeDescription="Create a new document." ma:contentTypeScope="" ma:versionID="308c419822eca16213fccab147bd08e2">
   <xsd:schema xmlns:xsd="http://www.w3.org/2001/XMLSchema" xmlns:xs="http://www.w3.org/2001/XMLSchema" xmlns:p="http://schemas.microsoft.com/office/2006/metadata/properties" targetNamespace="http://schemas.microsoft.com/office/2006/metadata/properties" ma:root="true" ma:fieldsID="c64490b4aec6201516c3a874156f37b2">
     <xsd:element name="properties">
@@ -9886,6 +9882,15 @@
 </ct:contentTypeSchema>
 </file>
 
+<file path=customXml/item2.xml><?xml version="1.0" encoding="utf-8"?>
+<?mso-contentType ?>
+<FormTemplates xmlns="http://schemas.microsoft.com/sharepoint/v3/contenttype/forms">
+  <Display>DocumentLibraryForm</Display>
+  <Edit>DocumentLibraryForm</Edit>
+  <New>DocumentLibraryForm</New>
+</FormTemplates>
+</file>
+
 <file path=customXml/item3.xml><?xml version="1.0" encoding="utf-8"?>
 <p:properties xmlns:p="http://schemas.microsoft.com/office/2006/metadata/properties" xmlns:xsi="http://www.w3.org/2001/XMLSchema-instance" xmlns:pc="http://schemas.microsoft.com/office/infopath/2007/PartnerControls">
   <documentManagement/>
@@ -9893,14 +9898,6 @@
 </file>
 
 <file path=customXml/itemProps1.xml><?xml version="1.0" encoding="utf-8"?>
-<ds:datastoreItem xmlns:ds="http://schemas.openxmlformats.org/officeDocument/2006/customXml" ds:itemID="{800A66D2-D549-4A1D-988B-7AA6D122F83F}">
-  <ds:schemaRefs>
-    <ds:schemaRef ds:uri="http://schemas.microsoft.com/sharepoint/v3/contenttype/forms"/>
-  </ds:schemaRefs>
-</ds:datastoreItem>
-</file>
-
-<file path=customXml/itemProps2.xml><?xml version="1.0" encoding="utf-8"?>
 <ds:datastoreItem xmlns:ds="http://schemas.openxmlformats.org/officeDocument/2006/customXml" ds:itemID="{4B9C9F4C-0F1C-4743-BD84-BFA3E1A808BD}">
   <ds:schemaRefs>
     <ds:schemaRef ds:uri="http://schemas.microsoft.com/office/2006/metadata/contentType"/>
@@ -9912,6 +9909,14 @@
     <ds:schemaRef ds:uri="http://purl.org/dc/terms/"/>
     <ds:schemaRef ds:uri="http://schemas.microsoft.com/internal/obd"/>
     <ds:schemaRef ds:uri="http://schemas.microsoft.com/office/infopath/2007/PartnerControls"/>
+  </ds:schemaRefs>
+</ds:datastoreItem>
+</file>
+
+<file path=customXml/itemProps2.xml><?xml version="1.0" encoding="utf-8"?>
+<ds:datastoreItem xmlns:ds="http://schemas.openxmlformats.org/officeDocument/2006/customXml" ds:itemID="{800A66D2-D549-4A1D-988B-7AA6D122F83F}">
+  <ds:schemaRefs>
+    <ds:schemaRef ds:uri="http://schemas.microsoft.com/sharepoint/v3/contenttype/forms"/>
   </ds:schemaRefs>
 </ds:datastoreItem>
 </file>

</xml_diff>